<commit_message>
End of Module 1
</commit_message>
<xml_diff>
--- a/Slides/Module 1 - Introduction to Flask.pptx
+++ b/Slides/Module 1 - Introduction to Flask.pptx
@@ -8002,8 +8002,12 @@
                 <a:latin typeface="Consolas" panose="020B0609020204030204" pitchFamily="49" charset="0"/>
                 <a:cs typeface="Consolas" panose="020B0609020204030204" pitchFamily="49" charset="0"/>
               </a:rPr>
-              <a:t>&lt;html&gt;</a:t>
-            </a:r>
+              <a:t>&lt;head&gt;</a:t>
+            </a:r>
+            <a:endParaRPr lang="en-US" sz="4000" dirty="0" smtClean="0">
+              <a:latin typeface="Consolas" panose="020B0609020204030204" pitchFamily="49" charset="0"/>
+              <a:cs typeface="Consolas" panose="020B0609020204030204" pitchFamily="49" charset="0"/>
+            </a:endParaRPr>
           </a:p>
           <a:p>
             <a:r>
@@ -8020,7 +8024,7 @@
                 <a:latin typeface="Consolas" panose="020B0609020204030204" pitchFamily="49" charset="0"/>
                 <a:cs typeface="Consolas" panose="020B0609020204030204" pitchFamily="49" charset="0"/>
               </a:rPr>
-              <a:t>&lt;/html&gt;</a:t>
+              <a:t>&lt;/head&gt;</a:t>
             </a:r>
             <a:endParaRPr lang="en-US" sz="4000" dirty="0">
               <a:latin typeface="Consolas" panose="020B0609020204030204" pitchFamily="49" charset="0"/>
@@ -8733,6 +8737,13 @@
   <p:clrMapOvr>
     <a:masterClrMapping/>
   </p:clrMapOvr>
+  <p:timing>
+    <p:tnLst>
+      <p:par>
+        <p:cTn id="1" dur="indefinite" restart="never" nodeType="tmRoot"/>
+      </p:par>
+    </p:tnLst>
+  </p:timing>
 </p:sld>
 </file>
 
@@ -8809,6 +8820,13 @@
   <p:clrMapOvr>
     <a:masterClrMapping/>
   </p:clrMapOvr>
+  <p:timing>
+    <p:tnLst>
+      <p:par>
+        <p:cTn id="1" dur="indefinite" restart="never" nodeType="tmRoot"/>
+      </p:par>
+    </p:tnLst>
+  </p:timing>
 </p:sld>
 </file>
 
@@ -8921,14 +8939,14 @@
                 <a:gridCol w="5762625">
                   <a:extLst>
                     <a:ext uri="{9D8B030D-6E8A-4147-A177-3AD203B41FA5}">
-                      <a16:colId xmlns="" xmlns:a16="http://schemas.microsoft.com/office/drawing/2014/main" val="1632794655"/>
+                      <a16:colId xmlns:a16="http://schemas.microsoft.com/office/drawing/2014/main" xmlns="" val="1632794655"/>
                     </a:ext>
                   </a:extLst>
                 </a:gridCol>
                 <a:gridCol w="5762625">
                   <a:extLst>
                     <a:ext uri="{9D8B030D-6E8A-4147-A177-3AD203B41FA5}">
-                      <a16:colId xmlns="" xmlns:a16="http://schemas.microsoft.com/office/drawing/2014/main" val="2011313899"/>
+                      <a16:colId xmlns:a16="http://schemas.microsoft.com/office/drawing/2014/main" xmlns="" val="2011313899"/>
                     </a:ext>
                   </a:extLst>
                 </a:gridCol>
@@ -8966,7 +8984,7 @@
                 </a:tc>
                 <a:extLst>
                   <a:ext uri="{0D108BD9-81ED-4DB2-BD59-A6C34878D82A}">
-                    <a16:rowId xmlns="" xmlns:a16="http://schemas.microsoft.com/office/drawing/2014/main" val="1789177411"/>
+                    <a16:rowId xmlns:a16="http://schemas.microsoft.com/office/drawing/2014/main" xmlns="" val="1789177411"/>
                   </a:ext>
                 </a:extLst>
               </a:tr>
@@ -9013,7 +9031,7 @@
                 </a:tc>
                 <a:extLst>
                   <a:ext uri="{0D108BD9-81ED-4DB2-BD59-A6C34878D82A}">
-                    <a16:rowId xmlns="" xmlns:a16="http://schemas.microsoft.com/office/drawing/2014/main" val="3842815335"/>
+                    <a16:rowId xmlns:a16="http://schemas.microsoft.com/office/drawing/2014/main" xmlns="" val="3842815335"/>
                   </a:ext>
                 </a:extLst>
               </a:tr>
@@ -9060,7 +9078,7 @@
                 </a:tc>
                 <a:extLst>
                   <a:ext uri="{0D108BD9-81ED-4DB2-BD59-A6C34878D82A}">
-                    <a16:rowId xmlns="" xmlns:a16="http://schemas.microsoft.com/office/drawing/2014/main" val="321066646"/>
+                    <a16:rowId xmlns:a16="http://schemas.microsoft.com/office/drawing/2014/main" xmlns="" val="321066646"/>
                   </a:ext>
                 </a:extLst>
               </a:tr>
@@ -9131,7 +9149,7 @@
                 </a:tc>
                 <a:extLst>
                   <a:ext uri="{0D108BD9-81ED-4DB2-BD59-A6C34878D82A}">
-                    <a16:rowId xmlns="" xmlns:a16="http://schemas.microsoft.com/office/drawing/2014/main" val="3812060533"/>
+                    <a16:rowId xmlns:a16="http://schemas.microsoft.com/office/drawing/2014/main" xmlns="" val="3812060533"/>
                   </a:ext>
                 </a:extLst>
               </a:tr>
@@ -9632,11 +9650,7 @@
           <a:p>
             <a:r>
               <a:rPr lang="en-GB" dirty="0" smtClean="0"/>
-              <a:t>Hello, </a:t>
-            </a:r>
-            <a:r>
-              <a:rPr lang="en-GB" dirty="0" smtClean="0"/>
-              <a:t>Flask</a:t>
+              <a:t>Hello, Flask</a:t>
             </a:r>
           </a:p>
           <a:p>
@@ -10578,6 +10592,15 @@
 </file>
 
 <file path=customXml/item1.xml><?xml version="1.0" encoding="utf-8"?>
+<?mso-contentType ?>
+<FormTemplates xmlns="http://schemas.microsoft.com/sharepoint/v3/contenttype/forms">
+  <Display>DocumentLibraryForm</Display>
+  <Edit>DocumentLibraryForm</Edit>
+  <New>DocumentLibraryForm</New>
+</FormTemplates>
+</file>
+
+<file path=customXml/item2.xml><?xml version="1.0" encoding="utf-8"?>
 <p:properties xmlns:p="http://schemas.microsoft.com/office/2006/metadata/properties" xmlns:xsi="http://www.w3.org/2001/XMLSchema-instance" xmlns:pc="http://schemas.microsoft.com/office/infopath/2007/PartnerControls">
   <documentManagement>
     <TaxCatchAll xmlns="230e9df3-be65-4c73-a93b-d1236ebd677e"/>
@@ -10588,15 +10611,6 @@
     </TaxKeywordTaxHTField>
   </documentManagement>
 </p:properties>
-</file>
-
-<file path=customXml/item2.xml><?xml version="1.0" encoding="utf-8"?>
-<?mso-contentType ?>
-<FormTemplates xmlns="http://schemas.microsoft.com/sharepoint/v3/contenttype/forms">
-  <Display>DocumentLibraryForm</Display>
-  <Edit>DocumentLibraryForm</Edit>
-  <New>DocumentLibraryForm</New>
-</FormTemplates>
 </file>
 
 <file path=customXml/item3.xml><?xml version="1.0" encoding="utf-8"?>
@@ -10782,6 +10796,14 @@
 </file>
 
 <file path=customXml/itemProps1.xml><?xml version="1.0" encoding="utf-8"?>
+<ds:datastoreItem xmlns:ds="http://schemas.openxmlformats.org/officeDocument/2006/customXml" ds:itemID="{B0CA13EC-1D3C-4D6F-8D1C-E8A452CFC79A}">
+  <ds:schemaRefs>
+    <ds:schemaRef ds:uri="http://schemas.microsoft.com/sharepoint/v3/contenttype/forms"/>
+  </ds:schemaRefs>
+</ds:datastoreItem>
+</file>
+
+<file path=customXml/itemProps2.xml><?xml version="1.0" encoding="utf-8"?>
 <ds:datastoreItem xmlns:ds="http://schemas.openxmlformats.org/officeDocument/2006/customXml" ds:itemID="{7025FDD9-4C58-4084-9F89-0E6ADD6FFF55}">
   <ds:schemaRefs>
     <ds:schemaRef ds:uri="http://purl.org/dc/elements/1.1/"/>
@@ -10795,14 +10817,6 @@
     <ds:schemaRef ds:uri="http://schemas.microsoft.com/office/infopath/2007/PartnerControls"/>
     <ds:schemaRef ds:uri="http://www.w3.org/XML/1998/namespace"/>
     <ds:schemaRef ds:uri="http://purl.org/dc/dcmitype/"/>
-  </ds:schemaRefs>
-</ds:datastoreItem>
-</file>
-
-<file path=customXml/itemProps2.xml><?xml version="1.0" encoding="utf-8"?>
-<ds:datastoreItem xmlns:ds="http://schemas.openxmlformats.org/officeDocument/2006/customXml" ds:itemID="{B0CA13EC-1D3C-4D6F-8D1C-E8A452CFC79A}">
-  <ds:schemaRefs>
-    <ds:schemaRef ds:uri="http://schemas.microsoft.com/sharepoint/v3/contenttype/forms"/>
   </ds:schemaRefs>
 </ds:datastoreItem>
 </file>

</xml_diff>